<commit_message>
add the timer and modify some png
</commit_message>
<xml_diff>
--- a/IMAGE/MakeImage/MakeImage.pptx
+++ b/IMAGE/MakeImage/MakeImage.pptx
@@ -272,7 +272,7 @@
           <a:p>
             <a:fld id="{5D9234D8-723F-4F25-AFAD-BED4275BC66D}" type="datetimeFigureOut">
               <a:rPr lang="zh-CN" altLang="en-US" smtClean="0"/>
-              <a:t>2021/12/11</a:t>
+              <a:t>2021/12/13</a:t>
             </a:fld>
             <a:endParaRPr lang="zh-CN" altLang="en-US"/>
           </a:p>
@@ -470,7 +470,7 @@
           <a:p>
             <a:fld id="{5D9234D8-723F-4F25-AFAD-BED4275BC66D}" type="datetimeFigureOut">
               <a:rPr lang="zh-CN" altLang="en-US" smtClean="0"/>
-              <a:t>2021/12/11</a:t>
+              <a:t>2021/12/13</a:t>
             </a:fld>
             <a:endParaRPr lang="zh-CN" altLang="en-US"/>
           </a:p>
@@ -678,7 +678,7 @@
           <a:p>
             <a:fld id="{5D9234D8-723F-4F25-AFAD-BED4275BC66D}" type="datetimeFigureOut">
               <a:rPr lang="zh-CN" altLang="en-US" smtClean="0"/>
-              <a:t>2021/12/11</a:t>
+              <a:t>2021/12/13</a:t>
             </a:fld>
             <a:endParaRPr lang="zh-CN" altLang="en-US"/>
           </a:p>
@@ -876,7 +876,7 @@
           <a:p>
             <a:fld id="{5D9234D8-723F-4F25-AFAD-BED4275BC66D}" type="datetimeFigureOut">
               <a:rPr lang="zh-CN" altLang="en-US" smtClean="0"/>
-              <a:t>2021/12/11</a:t>
+              <a:t>2021/12/13</a:t>
             </a:fld>
             <a:endParaRPr lang="zh-CN" altLang="en-US"/>
           </a:p>
@@ -1151,7 +1151,7 @@
           <a:p>
             <a:fld id="{5D9234D8-723F-4F25-AFAD-BED4275BC66D}" type="datetimeFigureOut">
               <a:rPr lang="zh-CN" altLang="en-US" smtClean="0"/>
-              <a:t>2021/12/11</a:t>
+              <a:t>2021/12/13</a:t>
             </a:fld>
             <a:endParaRPr lang="zh-CN" altLang="en-US"/>
           </a:p>
@@ -1416,7 +1416,7 @@
           <a:p>
             <a:fld id="{5D9234D8-723F-4F25-AFAD-BED4275BC66D}" type="datetimeFigureOut">
               <a:rPr lang="zh-CN" altLang="en-US" smtClean="0"/>
-              <a:t>2021/12/11</a:t>
+              <a:t>2021/12/13</a:t>
             </a:fld>
             <a:endParaRPr lang="zh-CN" altLang="en-US"/>
           </a:p>
@@ -1828,7 +1828,7 @@
           <a:p>
             <a:fld id="{5D9234D8-723F-4F25-AFAD-BED4275BC66D}" type="datetimeFigureOut">
               <a:rPr lang="zh-CN" altLang="en-US" smtClean="0"/>
-              <a:t>2021/12/11</a:t>
+              <a:t>2021/12/13</a:t>
             </a:fld>
             <a:endParaRPr lang="zh-CN" altLang="en-US"/>
           </a:p>
@@ -1969,7 +1969,7 @@
           <a:p>
             <a:fld id="{5D9234D8-723F-4F25-AFAD-BED4275BC66D}" type="datetimeFigureOut">
               <a:rPr lang="zh-CN" altLang="en-US" smtClean="0"/>
-              <a:t>2021/12/11</a:t>
+              <a:t>2021/12/13</a:t>
             </a:fld>
             <a:endParaRPr lang="zh-CN" altLang="en-US"/>
           </a:p>
@@ -2082,7 +2082,7 @@
           <a:p>
             <a:fld id="{5D9234D8-723F-4F25-AFAD-BED4275BC66D}" type="datetimeFigureOut">
               <a:rPr lang="zh-CN" altLang="en-US" smtClean="0"/>
-              <a:t>2021/12/11</a:t>
+              <a:t>2021/12/13</a:t>
             </a:fld>
             <a:endParaRPr lang="zh-CN" altLang="en-US"/>
           </a:p>
@@ -2393,7 +2393,7 @@
           <a:p>
             <a:fld id="{5D9234D8-723F-4F25-AFAD-BED4275BC66D}" type="datetimeFigureOut">
               <a:rPr lang="zh-CN" altLang="en-US" smtClean="0"/>
-              <a:t>2021/12/11</a:t>
+              <a:t>2021/12/13</a:t>
             </a:fld>
             <a:endParaRPr lang="zh-CN" altLang="en-US"/>
           </a:p>
@@ -2681,7 +2681,7 @@
           <a:p>
             <a:fld id="{5D9234D8-723F-4F25-AFAD-BED4275BC66D}" type="datetimeFigureOut">
               <a:rPr lang="zh-CN" altLang="en-US" smtClean="0"/>
-              <a:t>2021/12/11</a:t>
+              <a:t>2021/12/13</a:t>
             </a:fld>
             <a:endParaRPr lang="zh-CN" altLang="en-US"/>
           </a:p>
@@ -2922,7 +2922,7 @@
           <a:p>
             <a:fld id="{5D9234D8-723F-4F25-AFAD-BED4275BC66D}" type="datetimeFigureOut">
               <a:rPr lang="zh-CN" altLang="en-US" smtClean="0"/>
-              <a:t>2021/12/11</a:t>
+              <a:t>2021/12/13</a:t>
             </a:fld>
             <a:endParaRPr lang="zh-CN" altLang="en-US"/>
           </a:p>
@@ -4189,6 +4189,189 @@
               <a:t>8192</a:t>
             </a:r>
             <a:endParaRPr lang="zh-CN" altLang="en-US" dirty="0"/>
+          </a:p>
+        </p:txBody>
+      </p:sp>
+      <p:sp>
+        <p:nvSpPr>
+          <p:cNvPr id="17" name="文本框 16">
+            <a:extLst>
+              <a:ext uri="{FF2B5EF4-FFF2-40B4-BE49-F238E27FC236}">
+                <a16:creationId xmlns:a16="http://schemas.microsoft.com/office/drawing/2014/main" id="{2ACD22AC-7B78-4A0B-A997-62A4055328E5}"/>
+              </a:ext>
+            </a:extLst>
+          </p:cNvPr>
+          <p:cNvSpPr txBox="1"/>
+          <p:nvPr/>
+        </p:nvSpPr>
+        <p:spPr>
+          <a:xfrm>
+            <a:off x="2897415" y="2439375"/>
+            <a:ext cx="631686" cy="523220"/>
+          </a:xfrm>
+          <a:prstGeom prst="rect">
+            <a:avLst/>
+          </a:prstGeom>
+          <a:noFill/>
+        </p:spPr>
+        <p:txBody>
+          <a:bodyPr wrap="square" rtlCol="0">
+            <a:spAutoFit/>
+          </a:bodyPr>
+          <a:lstStyle/>
+          <a:p>
+            <a:pPr algn="ctr"/>
+            <a:r>
+              <a:rPr lang="en-US" altLang="zh-CN" sz="2800" b="1" spc="-150" dirty="0">
+                <a:ln>
+                  <a:solidFill>
+                    <a:schemeClr val="tx1"/>
+                  </a:solidFill>
+                </a:ln>
+                <a:solidFill>
+                  <a:schemeClr val="bg1"/>
+                </a:solidFill>
+                <a:latin typeface="Copperplate Gothic Bold" panose="020E0705020206020404" pitchFamily="34" charset="0"/>
+                <a:ea typeface="锐字真言体免费商用" panose="02010600030101010101" pitchFamily="2" charset="-122"/>
+              </a:rPr>
+              <a:t>8</a:t>
+            </a:r>
+            <a:endParaRPr lang="zh-CN" altLang="en-US" sz="2800" b="1" spc="-150" dirty="0">
+              <a:ln>
+                <a:solidFill>
+                  <a:schemeClr val="tx1"/>
+                </a:solidFill>
+              </a:ln>
+              <a:solidFill>
+                <a:schemeClr val="bg1"/>
+              </a:solidFill>
+              <a:latin typeface="Copperplate Gothic Bold" panose="020E0705020206020404" pitchFamily="34" charset="0"/>
+              <a:ea typeface="锐字真言体免费商用" panose="02010600030101010101" pitchFamily="2" charset="-122"/>
+            </a:endParaRPr>
+          </a:p>
+        </p:txBody>
+      </p:sp>
+      <p:sp>
+        <p:nvSpPr>
+          <p:cNvPr id="20" name="箭头: 手杖形 19">
+            <a:extLst>
+              <a:ext uri="{FF2B5EF4-FFF2-40B4-BE49-F238E27FC236}">
+                <a16:creationId xmlns:a16="http://schemas.microsoft.com/office/drawing/2014/main" id="{EDE84B6D-43B9-4032-8EEA-E8AF20B63612}"/>
+              </a:ext>
+            </a:extLst>
+          </p:cNvPr>
+          <p:cNvSpPr/>
+          <p:nvPr/>
+        </p:nvSpPr>
+        <p:spPr>
+          <a:xfrm rot="2679853" flipH="1">
+            <a:off x="5396789" y="1178135"/>
+            <a:ext cx="874386" cy="883516"/>
+          </a:xfrm>
+          <a:prstGeom prst="uturnArrow">
+            <a:avLst>
+              <a:gd name="adj1" fmla="val 20491"/>
+              <a:gd name="adj2" fmla="val 25000"/>
+              <a:gd name="adj3" fmla="val 37153"/>
+              <a:gd name="adj4" fmla="val 43750"/>
+              <a:gd name="adj5" fmla="val 84903"/>
+            </a:avLst>
+          </a:prstGeom>
+          <a:solidFill>
+            <a:schemeClr val="bg1"/>
+          </a:solidFill>
+          <a:ln>
+            <a:solidFill>
+              <a:schemeClr val="tx1"/>
+            </a:solidFill>
+          </a:ln>
+        </p:spPr>
+        <p:style>
+          <a:lnRef idx="2">
+            <a:schemeClr val="accent1">
+              <a:shade val="50000"/>
+            </a:schemeClr>
+          </a:lnRef>
+          <a:fillRef idx="1">
+            <a:schemeClr val="accent1"/>
+          </a:fillRef>
+          <a:effectRef idx="0">
+            <a:schemeClr val="accent1"/>
+          </a:effectRef>
+          <a:fontRef idx="minor">
+            <a:schemeClr val="lt1"/>
+          </a:fontRef>
+        </p:style>
+        <p:txBody>
+          <a:bodyPr rtlCol="0" anchor="ctr"/>
+          <a:lstStyle/>
+          <a:p>
+            <a:pPr algn="ctr"/>
+            <a:endParaRPr lang="zh-CN" altLang="en-US" dirty="0"/>
+          </a:p>
+        </p:txBody>
+      </p:sp>
+      <p:sp>
+        <p:nvSpPr>
+          <p:cNvPr id="23" name="箭头: 环形 22">
+            <a:extLst>
+              <a:ext uri="{FF2B5EF4-FFF2-40B4-BE49-F238E27FC236}">
+                <a16:creationId xmlns:a16="http://schemas.microsoft.com/office/drawing/2014/main" id="{435F9971-1062-4C4F-AEF4-8BBD81A7178A}"/>
+              </a:ext>
+            </a:extLst>
+          </p:cNvPr>
+          <p:cNvSpPr/>
+          <p:nvPr/>
+        </p:nvSpPr>
+        <p:spPr>
+          <a:xfrm>
+            <a:off x="6682760" y="1094498"/>
+            <a:ext cx="1318046" cy="1318046"/>
+          </a:xfrm>
+          <a:prstGeom prst="circularArrow">
+            <a:avLst>
+              <a:gd name="adj1" fmla="val 15006"/>
+              <a:gd name="adj2" fmla="val 1855249"/>
+              <a:gd name="adj3" fmla="val 9175905"/>
+              <a:gd name="adj4" fmla="val 11527207"/>
+              <a:gd name="adj5" fmla="val 19485"/>
+            </a:avLst>
+          </a:prstGeom>
+          <a:solidFill>
+            <a:schemeClr val="bg1"/>
+          </a:solidFill>
+          <a:ln>
+            <a:solidFill>
+              <a:schemeClr val="tx1"/>
+            </a:solidFill>
+          </a:ln>
+        </p:spPr>
+        <p:style>
+          <a:lnRef idx="2">
+            <a:schemeClr val="accent1">
+              <a:shade val="50000"/>
+            </a:schemeClr>
+          </a:lnRef>
+          <a:fillRef idx="1">
+            <a:schemeClr val="accent1"/>
+          </a:fillRef>
+          <a:effectRef idx="0">
+            <a:schemeClr val="accent1"/>
+          </a:effectRef>
+          <a:fontRef idx="minor">
+            <a:schemeClr val="lt1"/>
+          </a:fontRef>
+        </p:style>
+        <p:txBody>
+          <a:bodyPr rtlCol="0" anchor="ctr"/>
+          <a:lstStyle/>
+          <a:p>
+            <a:pPr algn="ctr"/>
+            <a:endParaRPr lang="zh-CN" altLang="en-US">
+              <a:solidFill>
+                <a:schemeClr val="tx1"/>
+              </a:solidFill>
+            </a:endParaRPr>
           </a:p>
         </p:txBody>
       </p:sp>

</xml_diff>